<commit_message>
Updated  DG for agenda and reminder, added method in ScheduleCommandTest
</commit_message>
<xml_diff>
--- a/docs/diagrams/NewModelComponentClassDiagram.pptx
+++ b/docs/diagrams/NewModelComponentClassDiagram.pptx
@@ -109,7 +109,7 @@
   </p:defaultTextStyle>
   <p:extLst>
     <p:ext uri="{EFAFB233-063F-42B5-8137-9DF3F51BA10A}">
-      <p15:sldGuideLst xmlns:p15="http://schemas.microsoft.com/office/powerpoint/2012/main">
+      <p15:sldGuideLst xmlns:p15="http://schemas.microsoft.com/office/powerpoint/2012/main" xmlns="">
         <p15:guide id="1" orient="horz" pos="1488">
           <p15:clr>
             <a:srgbClr val="A4A3A4"/>
@@ -208,7 +208,7 @@
           <a:p>
             <a:fld id="{F5CC4B3F-88C1-4FFA-B1B6-F41C21DC6924}" type="datetimeFigureOut">
               <a:rPr lang="en-US" smtClean="0"/>
-              <a:t>10/29/2017</a:t>
+              <a:t>8/11/17</a:t>
             </a:fld>
             <a:endParaRPr lang="en-US"/>
           </a:p>
@@ -657,7 +657,7 @@
           <a:p>
             <a:fld id="{78C97017-6FC3-485B-9764-EAC9E56C1D49}" type="datetimeFigureOut">
               <a:rPr lang="en-US" smtClean="0"/>
-              <a:t>10/29/2017</a:t>
+              <a:t>8/11/17</a:t>
             </a:fld>
             <a:endParaRPr lang="en-US"/>
           </a:p>
@@ -827,7 +827,7 @@
           <a:p>
             <a:fld id="{78C97017-6FC3-485B-9764-EAC9E56C1D49}" type="datetimeFigureOut">
               <a:rPr lang="en-US" smtClean="0"/>
-              <a:t>10/29/2017</a:t>
+              <a:t>8/11/17</a:t>
             </a:fld>
             <a:endParaRPr lang="en-US"/>
           </a:p>
@@ -1007,7 +1007,7 @@
           <a:p>
             <a:fld id="{78C97017-6FC3-485B-9764-EAC9E56C1D49}" type="datetimeFigureOut">
               <a:rPr lang="en-US" smtClean="0"/>
-              <a:t>10/29/2017</a:t>
+              <a:t>8/11/17</a:t>
             </a:fld>
             <a:endParaRPr lang="en-US"/>
           </a:p>
@@ -1177,7 +1177,7 @@
           <a:p>
             <a:fld id="{78C97017-6FC3-485B-9764-EAC9E56C1D49}" type="datetimeFigureOut">
               <a:rPr lang="en-US" smtClean="0"/>
-              <a:t>10/29/2017</a:t>
+              <a:t>8/11/17</a:t>
             </a:fld>
             <a:endParaRPr lang="en-US"/>
           </a:p>
@@ -1423,7 +1423,7 @@
           <a:p>
             <a:fld id="{78C97017-6FC3-485B-9764-EAC9E56C1D49}" type="datetimeFigureOut">
               <a:rPr lang="en-US" smtClean="0"/>
-              <a:t>10/29/2017</a:t>
+              <a:t>8/11/17</a:t>
             </a:fld>
             <a:endParaRPr lang="en-US"/>
           </a:p>
@@ -1711,7 +1711,7 @@
           <a:p>
             <a:fld id="{78C97017-6FC3-485B-9764-EAC9E56C1D49}" type="datetimeFigureOut">
               <a:rPr lang="en-US" smtClean="0"/>
-              <a:t>10/29/2017</a:t>
+              <a:t>8/11/17</a:t>
             </a:fld>
             <a:endParaRPr lang="en-US"/>
           </a:p>
@@ -2133,7 +2133,7 @@
           <a:p>
             <a:fld id="{78C97017-6FC3-485B-9764-EAC9E56C1D49}" type="datetimeFigureOut">
               <a:rPr lang="en-US" smtClean="0"/>
-              <a:t>10/29/2017</a:t>
+              <a:t>8/11/17</a:t>
             </a:fld>
             <a:endParaRPr lang="en-US"/>
           </a:p>
@@ -2251,7 +2251,7 @@
           <a:p>
             <a:fld id="{78C97017-6FC3-485B-9764-EAC9E56C1D49}" type="datetimeFigureOut">
               <a:rPr lang="en-US" smtClean="0"/>
-              <a:t>10/29/2017</a:t>
+              <a:t>8/11/17</a:t>
             </a:fld>
             <a:endParaRPr lang="en-US"/>
           </a:p>
@@ -2346,7 +2346,7 @@
           <a:p>
             <a:fld id="{78C97017-6FC3-485B-9764-EAC9E56C1D49}" type="datetimeFigureOut">
               <a:rPr lang="en-US" smtClean="0"/>
-              <a:t>10/29/2017</a:t>
+              <a:t>8/11/17</a:t>
             </a:fld>
             <a:endParaRPr lang="en-US"/>
           </a:p>
@@ -2623,7 +2623,7 @@
           <a:p>
             <a:fld id="{78C97017-6FC3-485B-9764-EAC9E56C1D49}" type="datetimeFigureOut">
               <a:rPr lang="en-US" smtClean="0"/>
-              <a:t>10/29/2017</a:t>
+              <a:t>8/11/17</a:t>
             </a:fld>
             <a:endParaRPr lang="en-US"/>
           </a:p>
@@ -2876,7 +2876,7 @@
           <a:p>
             <a:fld id="{78C97017-6FC3-485B-9764-EAC9E56C1D49}" type="datetimeFigureOut">
               <a:rPr lang="en-US" smtClean="0"/>
-              <a:t>10/29/2017</a:t>
+              <a:t>8/11/17</a:t>
             </a:fld>
             <a:endParaRPr lang="en-US"/>
           </a:p>
@@ -3089,7 +3089,7 @@
           <a:p>
             <a:fld id="{78C97017-6FC3-485B-9764-EAC9E56C1D49}" type="datetimeFigureOut">
               <a:rPr lang="en-US" smtClean="0"/>
-              <a:t>10/29/2017</a:t>
+              <a:t>8/11/17</a:t>
             </a:fld>
             <a:endParaRPr lang="en-US"/>
           </a:p>
@@ -3472,8 +3472,8 @@
         </p:nvSpPr>
         <p:spPr>
           <a:xfrm>
-            <a:off x="762000" y="455227"/>
-            <a:ext cx="8229600" cy="4119209"/>
+            <a:off x="609600" y="228600"/>
+            <a:ext cx="8458200" cy="4878773"/>
           </a:xfrm>
           <a:prstGeom prst="roundRect">
             <a:avLst>
@@ -5006,8 +5006,8 @@
         </p:nvSpPr>
         <p:spPr>
           <a:xfrm>
-            <a:off x="7712397" y="3210194"/>
-            <a:ext cx="708186" cy="285783"/>
+            <a:off x="7712396" y="3210194"/>
+            <a:ext cx="1050604" cy="371206"/>
           </a:xfrm>
           <a:prstGeom prst="rect">
             <a:avLst/>
@@ -5039,12 +5039,12 @@
           <a:p>
             <a:pPr algn="ctr"/>
             <a:r>
-              <a:rPr lang="en-US" sz="1050" dirty="0" smtClean="0">
+              <a:rPr lang="en-US" sz="1050" dirty="0" err="1" smtClean="0">
                 <a:solidFill>
                   <a:srgbClr val="7030A0"/>
                 </a:solidFill>
               </a:rPr>
-              <a:t>Email</a:t>
+              <a:t>UniqueEmailList</a:t>
             </a:r>
             <a:endParaRPr lang="en-SG" sz="1050" dirty="0">
               <a:solidFill>
@@ -5066,7 +5066,7 @@
         <p:spPr>
           <a:xfrm>
             <a:off x="7277995" y="3034891"/>
-            <a:ext cx="434402" cy="318195"/>
+            <a:ext cx="434401" cy="360906"/>
           </a:xfrm>
           <a:prstGeom prst="bentConnector3">
             <a:avLst/>
@@ -5103,7 +5103,7 @@
         </p:nvSpPr>
         <p:spPr>
           <a:xfrm>
-            <a:off x="7712397" y="3533171"/>
+            <a:off x="7696200" y="3657600"/>
             <a:ext cx="708186" cy="285783"/>
           </a:xfrm>
           <a:prstGeom prst="rect">
@@ -5163,7 +5163,7 @@
         <p:spPr>
           <a:xfrm>
             <a:off x="7277995" y="3034891"/>
-            <a:ext cx="434402" cy="641172"/>
+            <a:ext cx="418205" cy="765601"/>
           </a:xfrm>
           <a:prstGeom prst="bentConnector3">
             <a:avLst/>
@@ -5875,7 +5875,7 @@
         </p:nvSpPr>
         <p:spPr>
           <a:xfrm>
-            <a:off x="7712397" y="3796157"/>
+            <a:off x="6248400" y="3886200"/>
             <a:ext cx="708186" cy="285783"/>
           </a:xfrm>
           <a:prstGeom prst="rect">
@@ -6046,12 +6046,12 @@
           <a:p>
             <a:pPr algn="ctr"/>
             <a:r>
-              <a:rPr lang="en-US" sz="1100" dirty="0" smtClean="0">
+              <a:rPr lang="en-US" sz="1100" dirty="0">
                 <a:solidFill>
                   <a:srgbClr val="7030A0"/>
                 </a:solidFill>
               </a:rPr>
-              <a:t>1</a:t>
+              <a:t>2</a:t>
             </a:r>
             <a:endParaRPr lang="en-SG" sz="1100" dirty="0">
               <a:solidFill>
@@ -6527,6 +6527,1064 @@
           </a:fontRef>
         </p:style>
       </p:cxnSp>
+      <p:sp>
+        <p:nvSpPr>
+          <p:cNvPr id="73" name="Rectangle 8"/>
+          <p:cNvSpPr/>
+          <p:nvPr/>
+        </p:nvSpPr>
+        <p:spPr>
+          <a:xfrm>
+            <a:off x="7315200" y="685800"/>
+            <a:ext cx="1524000" cy="438183"/>
+          </a:xfrm>
+          <a:prstGeom prst="rect">
+            <a:avLst/>
+          </a:prstGeom>
+          <a:ln w="19050">
+            <a:solidFill>
+              <a:srgbClr val="7030A0"/>
+            </a:solidFill>
+          </a:ln>
+          <a:effectLst/>
+        </p:spPr>
+        <p:style>
+          <a:lnRef idx="1">
+            <a:schemeClr val="accent4"/>
+          </a:lnRef>
+          <a:fillRef idx="2">
+            <a:schemeClr val="accent4"/>
+          </a:fillRef>
+          <a:effectRef idx="1">
+            <a:schemeClr val="accent4"/>
+          </a:effectRef>
+          <a:fontRef idx="minor">
+            <a:schemeClr val="dk1"/>
+          </a:fontRef>
+        </p:style>
+        <p:txBody>
+          <a:bodyPr rtlCol="0" anchor="ctr"/>
+          <a:lstStyle/>
+          <a:p>
+            <a:pPr algn="ctr"/>
+            <a:r>
+              <a:rPr lang="en-US" sz="1050" dirty="0" err="1" smtClean="0">
+                <a:solidFill>
+                  <a:srgbClr val="7030A0"/>
+                </a:solidFill>
+              </a:rPr>
+              <a:t>UniquePersonNameList</a:t>
+            </a:r>
+            <a:endParaRPr lang="en-SG" sz="1050" dirty="0">
+              <a:solidFill>
+                <a:srgbClr val="7030A0"/>
+              </a:solidFill>
+            </a:endParaRPr>
+          </a:p>
+        </p:txBody>
+      </p:sp>
+      <p:cxnSp>
+        <p:nvCxnSpPr>
+          <p:cNvPr id="74" name="Elbow Connector 73"/>
+          <p:cNvCxnSpPr>
+            <a:stCxn id="103" idx="0"/>
+            <a:endCxn id="73" idx="1"/>
+          </p:cNvCxnSpPr>
+          <p:nvPr/>
+        </p:nvCxnSpPr>
+        <p:spPr>
+          <a:xfrm rot="5400000" flipH="1" flipV="1">
+            <a:off x="7027798" y="953645"/>
+            <a:ext cx="336154" cy="238649"/>
+          </a:xfrm>
+          <a:prstGeom prst="bentConnector2">
+            <a:avLst/>
+          </a:prstGeom>
+          <a:ln w="19050">
+            <a:solidFill>
+              <a:srgbClr val="7030A0"/>
+            </a:solidFill>
+            <a:headEnd type="none" w="med" len="med"/>
+            <a:tailEnd type="arrow" w="med" len="med"/>
+          </a:ln>
+          <a:effectLst/>
+        </p:spPr>
+        <p:style>
+          <a:lnRef idx="1">
+            <a:schemeClr val="accent2"/>
+          </a:lnRef>
+          <a:fillRef idx="2">
+            <a:schemeClr val="accent2"/>
+          </a:fillRef>
+          <a:effectRef idx="1">
+            <a:schemeClr val="accent2"/>
+          </a:effectRef>
+          <a:fontRef idx="minor">
+            <a:schemeClr val="dk1"/>
+          </a:fontRef>
+        </p:style>
+      </p:cxnSp>
+      <p:sp>
+        <p:nvSpPr>
+          <p:cNvPr id="82" name="Flowchart: Decision 96"/>
+          <p:cNvSpPr/>
+          <p:nvPr/>
+        </p:nvSpPr>
+        <p:spPr>
+          <a:xfrm rot="16200000">
+            <a:off x="8579266" y="3003134"/>
+            <a:ext cx="236048" cy="173380"/>
+          </a:xfrm>
+          <a:prstGeom prst="flowChartDecision">
+            <a:avLst/>
+          </a:prstGeom>
+          <a:noFill/>
+          <a:ln w="19050">
+            <a:solidFill>
+              <a:srgbClr val="7030A0"/>
+            </a:solidFill>
+          </a:ln>
+          <a:effectLst/>
+        </p:spPr>
+        <p:style>
+          <a:lnRef idx="1">
+            <a:schemeClr val="accent6"/>
+          </a:lnRef>
+          <a:fillRef idx="2">
+            <a:schemeClr val="accent6"/>
+          </a:fillRef>
+          <a:effectRef idx="1">
+            <a:schemeClr val="accent6"/>
+          </a:effectRef>
+          <a:fontRef idx="minor">
+            <a:schemeClr val="dk1"/>
+          </a:fontRef>
+        </p:style>
+        <p:txBody>
+          <a:bodyPr rtlCol="0" anchor="ctr"/>
+          <a:lstStyle/>
+          <a:p>
+            <a:pPr algn="ctr"/>
+            <a:endParaRPr lang="en-US" sz="1050"/>
+          </a:p>
+        </p:txBody>
+      </p:sp>
+      <p:sp>
+        <p:nvSpPr>
+          <p:cNvPr id="88" name="Rectangle 8"/>
+          <p:cNvSpPr/>
+          <p:nvPr/>
+        </p:nvSpPr>
+        <p:spPr>
+          <a:xfrm>
+            <a:off x="8534400" y="2286000"/>
+            <a:ext cx="483700" cy="346760"/>
+          </a:xfrm>
+          <a:prstGeom prst="rect">
+            <a:avLst/>
+          </a:prstGeom>
+          <a:ln w="19050">
+            <a:solidFill>
+              <a:srgbClr val="7030A0"/>
+            </a:solidFill>
+          </a:ln>
+          <a:effectLst/>
+        </p:spPr>
+        <p:style>
+          <a:lnRef idx="1">
+            <a:schemeClr val="accent4"/>
+          </a:lnRef>
+          <a:fillRef idx="2">
+            <a:schemeClr val="accent4"/>
+          </a:fillRef>
+          <a:effectRef idx="1">
+            <a:schemeClr val="accent4"/>
+          </a:effectRef>
+          <a:fontRef idx="minor">
+            <a:schemeClr val="dk1"/>
+          </a:fontRef>
+        </p:style>
+        <p:txBody>
+          <a:bodyPr rtlCol="0" anchor="ctr"/>
+          <a:lstStyle/>
+          <a:p>
+            <a:pPr algn="ctr"/>
+            <a:r>
+              <a:rPr lang="en-US" sz="1050" dirty="0" smtClean="0">
+                <a:solidFill>
+                  <a:srgbClr val="7030A0"/>
+                </a:solidFill>
+              </a:rPr>
+              <a:t>Email</a:t>
+            </a:r>
+            <a:endParaRPr lang="en-SG" sz="1050" dirty="0">
+              <a:solidFill>
+                <a:srgbClr val="7030A0"/>
+              </a:solidFill>
+            </a:endParaRPr>
+          </a:p>
+        </p:txBody>
+      </p:sp>
+      <p:cxnSp>
+        <p:nvCxnSpPr>
+          <p:cNvPr id="90" name="Elbow Connector 89"/>
+          <p:cNvCxnSpPr>
+            <a:endCxn id="88" idx="2"/>
+          </p:cNvCxnSpPr>
+          <p:nvPr/>
+        </p:nvCxnSpPr>
+        <p:spPr>
+          <a:xfrm rot="5400000" flipH="1" flipV="1">
+            <a:off x="8523906" y="2795656"/>
+            <a:ext cx="415240" cy="89448"/>
+          </a:xfrm>
+          <a:prstGeom prst="bentConnector3">
+            <a:avLst>
+              <a:gd name="adj1" fmla="val 50000"/>
+            </a:avLst>
+          </a:prstGeom>
+          <a:ln w="19050">
+            <a:solidFill>
+              <a:srgbClr val="7030A0"/>
+            </a:solidFill>
+            <a:headEnd type="none" w="med" len="med"/>
+            <a:tailEnd type="arrow" w="med" len="med"/>
+          </a:ln>
+          <a:effectLst/>
+        </p:spPr>
+        <p:style>
+          <a:lnRef idx="1">
+            <a:schemeClr val="accent2"/>
+          </a:lnRef>
+          <a:fillRef idx="2">
+            <a:schemeClr val="accent2"/>
+          </a:fillRef>
+          <a:effectRef idx="1">
+            <a:schemeClr val="accent2"/>
+          </a:effectRef>
+          <a:fontRef idx="minor">
+            <a:schemeClr val="dk1"/>
+          </a:fontRef>
+        </p:style>
+      </p:cxnSp>
+      <p:sp>
+        <p:nvSpPr>
+          <p:cNvPr id="91" name="TextBox 90"/>
+          <p:cNvSpPr txBox="1"/>
+          <p:nvPr/>
+        </p:nvSpPr>
+        <p:spPr>
+          <a:xfrm>
+            <a:off x="8839200" y="2667000"/>
+            <a:ext cx="189257" cy="178683"/>
+          </a:xfrm>
+          <a:prstGeom prst="rect">
+            <a:avLst/>
+          </a:prstGeom>
+          <a:noFill/>
+        </p:spPr>
+        <p:txBody>
+          <a:bodyPr wrap="square" lIns="0" tIns="0" rIns="0" bIns="0" rtlCol="0">
+            <a:noAutofit/>
+          </a:bodyPr>
+          <a:lstStyle/>
+          <a:p>
+            <a:pPr algn="ctr"/>
+            <a:r>
+              <a:rPr lang="en-US" sz="1100" dirty="0" smtClean="0">
+                <a:solidFill>
+                  <a:srgbClr val="7030A0"/>
+                </a:solidFill>
+              </a:rPr>
+              <a:t>1*</a:t>
+            </a:r>
+            <a:endParaRPr lang="en-SG" sz="1100" dirty="0">
+              <a:solidFill>
+                <a:srgbClr val="7030A0"/>
+              </a:solidFill>
+            </a:endParaRPr>
+          </a:p>
+        </p:txBody>
+      </p:sp>
+      <p:sp>
+        <p:nvSpPr>
+          <p:cNvPr id="93" name="Flowchart: Decision 96"/>
+          <p:cNvSpPr/>
+          <p:nvPr/>
+        </p:nvSpPr>
+        <p:spPr>
+          <a:xfrm>
+            <a:off x="7924800" y="3962400"/>
+            <a:ext cx="304800" cy="228600"/>
+          </a:xfrm>
+          <a:prstGeom prst="flowChartDecision">
+            <a:avLst/>
+          </a:prstGeom>
+          <a:solidFill>
+            <a:srgbClr val="7030A0"/>
+          </a:solidFill>
+          <a:ln w="19050">
+            <a:solidFill>
+              <a:srgbClr val="7030A0"/>
+            </a:solidFill>
+          </a:ln>
+          <a:effectLst/>
+        </p:spPr>
+        <p:style>
+          <a:lnRef idx="1">
+            <a:schemeClr val="accent6"/>
+          </a:lnRef>
+          <a:fillRef idx="2">
+            <a:schemeClr val="accent6"/>
+          </a:fillRef>
+          <a:effectRef idx="1">
+            <a:schemeClr val="accent6"/>
+          </a:effectRef>
+          <a:fontRef idx="minor">
+            <a:schemeClr val="dk1"/>
+          </a:fontRef>
+        </p:style>
+        <p:txBody>
+          <a:bodyPr rtlCol="0" anchor="ctr"/>
+          <a:lstStyle/>
+          <a:p>
+            <a:pPr algn="ctr"/>
+            <a:endParaRPr lang="en-US" sz="1050"/>
+          </a:p>
+        </p:txBody>
+      </p:sp>
+      <p:cxnSp>
+        <p:nvCxnSpPr>
+          <p:cNvPr id="95" name="Elbow Connector 94"/>
+          <p:cNvCxnSpPr>
+            <a:stCxn id="93" idx="2"/>
+            <a:endCxn id="113" idx="0"/>
+          </p:cNvCxnSpPr>
+          <p:nvPr/>
+        </p:nvCxnSpPr>
+        <p:spPr>
+          <a:xfrm rot="5400000">
+            <a:off x="7130297" y="3777497"/>
+            <a:ext cx="533400" cy="1360407"/>
+          </a:xfrm>
+          <a:prstGeom prst="bentConnector3">
+            <a:avLst>
+              <a:gd name="adj1" fmla="val 50000"/>
+            </a:avLst>
+          </a:prstGeom>
+          <a:ln w="19050">
+            <a:solidFill>
+              <a:srgbClr val="7030A0"/>
+            </a:solidFill>
+            <a:headEnd type="none" w="med" len="med"/>
+            <a:tailEnd type="arrow" w="med" len="med"/>
+          </a:ln>
+          <a:effectLst/>
+        </p:spPr>
+        <p:style>
+          <a:lnRef idx="1">
+            <a:schemeClr val="accent2"/>
+          </a:lnRef>
+          <a:fillRef idx="2">
+            <a:schemeClr val="accent2"/>
+          </a:fillRef>
+          <a:effectRef idx="1">
+            <a:schemeClr val="accent2"/>
+          </a:effectRef>
+          <a:fontRef idx="minor">
+            <a:schemeClr val="dk1"/>
+          </a:fontRef>
+        </p:style>
+      </p:cxnSp>
+      <p:cxnSp>
+        <p:nvCxnSpPr>
+          <p:cNvPr id="96" name="Elbow Connector 95"/>
+          <p:cNvCxnSpPr>
+            <a:stCxn id="93" idx="2"/>
+            <a:endCxn id="116" idx="0"/>
+          </p:cNvCxnSpPr>
+          <p:nvPr/>
+        </p:nvCxnSpPr>
+        <p:spPr>
+          <a:xfrm rot="5400000">
+            <a:off x="7448550" y="4095750"/>
+            <a:ext cx="533400" cy="723900"/>
+          </a:xfrm>
+          <a:prstGeom prst="bentConnector3">
+            <a:avLst/>
+          </a:prstGeom>
+          <a:ln w="19050">
+            <a:solidFill>
+              <a:srgbClr val="7030A0"/>
+            </a:solidFill>
+            <a:headEnd type="none" w="med" len="med"/>
+            <a:tailEnd type="arrow" w="med" len="med"/>
+          </a:ln>
+          <a:effectLst/>
+        </p:spPr>
+        <p:style>
+          <a:lnRef idx="1">
+            <a:schemeClr val="accent2"/>
+          </a:lnRef>
+          <a:fillRef idx="2">
+            <a:schemeClr val="accent2"/>
+          </a:fillRef>
+          <a:effectRef idx="1">
+            <a:schemeClr val="accent2"/>
+          </a:effectRef>
+          <a:fontRef idx="minor">
+            <a:schemeClr val="dk1"/>
+          </a:fontRef>
+        </p:style>
+      </p:cxnSp>
+      <p:cxnSp>
+        <p:nvCxnSpPr>
+          <p:cNvPr id="98" name="Elbow Connector 97"/>
+          <p:cNvCxnSpPr>
+            <a:endCxn id="115" idx="0"/>
+          </p:cNvCxnSpPr>
+          <p:nvPr/>
+        </p:nvCxnSpPr>
+        <p:spPr>
+          <a:xfrm rot="5400000">
+            <a:off x="7715250" y="4362450"/>
+            <a:ext cx="533400" cy="190500"/>
+          </a:xfrm>
+          <a:prstGeom prst="bentConnector3">
+            <a:avLst>
+              <a:gd name="adj1" fmla="val 50000"/>
+            </a:avLst>
+          </a:prstGeom>
+          <a:ln w="19050">
+            <a:solidFill>
+              <a:srgbClr val="7030A0"/>
+            </a:solidFill>
+            <a:headEnd type="none" w="med" len="med"/>
+            <a:tailEnd type="arrow" w="med" len="med"/>
+          </a:ln>
+          <a:effectLst/>
+        </p:spPr>
+        <p:style>
+          <a:lnRef idx="1">
+            <a:schemeClr val="accent2"/>
+          </a:lnRef>
+          <a:fillRef idx="2">
+            <a:schemeClr val="accent2"/>
+          </a:fillRef>
+          <a:effectRef idx="1">
+            <a:schemeClr val="accent2"/>
+          </a:effectRef>
+          <a:fontRef idx="minor">
+            <a:schemeClr val="dk1"/>
+          </a:fontRef>
+        </p:style>
+      </p:cxnSp>
+      <p:cxnSp>
+        <p:nvCxnSpPr>
+          <p:cNvPr id="106" name="Elbow Connector 105"/>
+          <p:cNvCxnSpPr>
+            <a:stCxn id="93" idx="2"/>
+            <a:endCxn id="117" idx="0"/>
+          </p:cNvCxnSpPr>
+          <p:nvPr/>
+        </p:nvCxnSpPr>
+        <p:spPr>
+          <a:xfrm rot="16200000" flipH="1">
+            <a:off x="8058150" y="4210050"/>
+            <a:ext cx="533400" cy="495300"/>
+          </a:xfrm>
+          <a:prstGeom prst="bentConnector3">
+            <a:avLst>
+              <a:gd name="adj1" fmla="val 50000"/>
+            </a:avLst>
+          </a:prstGeom>
+          <a:ln w="19050">
+            <a:solidFill>
+              <a:srgbClr val="7030A0"/>
+            </a:solidFill>
+            <a:headEnd type="none" w="med" len="med"/>
+            <a:tailEnd type="arrow" w="med" len="med"/>
+          </a:ln>
+          <a:effectLst/>
+        </p:spPr>
+        <p:style>
+          <a:lnRef idx="1">
+            <a:schemeClr val="accent2"/>
+          </a:lnRef>
+          <a:fillRef idx="2">
+            <a:schemeClr val="accent2"/>
+          </a:fillRef>
+          <a:effectRef idx="1">
+            <a:schemeClr val="accent2"/>
+          </a:effectRef>
+          <a:fontRef idx="minor">
+            <a:schemeClr val="dk1"/>
+          </a:fontRef>
+        </p:style>
+      </p:cxnSp>
+      <p:sp>
+        <p:nvSpPr>
+          <p:cNvPr id="113" name="Rectangle 8"/>
+          <p:cNvSpPr/>
+          <p:nvPr/>
+        </p:nvSpPr>
+        <p:spPr>
+          <a:xfrm>
+            <a:off x="6400800" y="4724400"/>
+            <a:ext cx="631986" cy="304800"/>
+          </a:xfrm>
+          <a:prstGeom prst="rect">
+            <a:avLst/>
+          </a:prstGeom>
+          <a:ln w="19050">
+            <a:solidFill>
+              <a:srgbClr val="7030A0"/>
+            </a:solidFill>
+          </a:ln>
+          <a:effectLst/>
+        </p:spPr>
+        <p:style>
+          <a:lnRef idx="1">
+            <a:schemeClr val="accent4"/>
+          </a:lnRef>
+          <a:fillRef idx="2">
+            <a:schemeClr val="accent4"/>
+          </a:fillRef>
+          <a:effectRef idx="1">
+            <a:schemeClr val="accent4"/>
+          </a:effectRef>
+          <a:fontRef idx="minor">
+            <a:schemeClr val="dk1"/>
+          </a:fontRef>
+        </p:style>
+        <p:txBody>
+          <a:bodyPr rtlCol="0" anchor="ctr"/>
+          <a:lstStyle/>
+          <a:p>
+            <a:pPr algn="ctr"/>
+            <a:r>
+              <a:rPr lang="en-US" sz="1050" dirty="0" smtClean="0">
+                <a:solidFill>
+                  <a:srgbClr val="7030A0"/>
+                </a:solidFill>
+              </a:rPr>
+              <a:t>Block</a:t>
+            </a:r>
+            <a:endParaRPr lang="en-SG" sz="1050" dirty="0">
+              <a:solidFill>
+                <a:srgbClr val="7030A0"/>
+              </a:solidFill>
+            </a:endParaRPr>
+          </a:p>
+        </p:txBody>
+      </p:sp>
+      <p:sp>
+        <p:nvSpPr>
+          <p:cNvPr id="115" name="Rectangle 8"/>
+          <p:cNvSpPr/>
+          <p:nvPr/>
+        </p:nvSpPr>
+        <p:spPr>
+          <a:xfrm>
+            <a:off x="7620000" y="4724400"/>
+            <a:ext cx="533400" cy="304800"/>
+          </a:xfrm>
+          <a:prstGeom prst="rect">
+            <a:avLst/>
+          </a:prstGeom>
+          <a:ln w="19050">
+            <a:solidFill>
+              <a:srgbClr val="7030A0"/>
+            </a:solidFill>
+          </a:ln>
+          <a:effectLst/>
+        </p:spPr>
+        <p:style>
+          <a:lnRef idx="1">
+            <a:schemeClr val="accent4"/>
+          </a:lnRef>
+          <a:fillRef idx="2">
+            <a:schemeClr val="accent4"/>
+          </a:fillRef>
+          <a:effectRef idx="1">
+            <a:schemeClr val="accent4"/>
+          </a:effectRef>
+          <a:fontRef idx="minor">
+            <a:schemeClr val="dk1"/>
+          </a:fontRef>
+        </p:style>
+        <p:txBody>
+          <a:bodyPr rtlCol="0" anchor="ctr"/>
+          <a:lstStyle/>
+          <a:p>
+            <a:pPr algn="ctr"/>
+            <a:r>
+              <a:rPr lang="en-US" sz="1050" dirty="0" smtClean="0">
+                <a:solidFill>
+                  <a:srgbClr val="7030A0"/>
+                </a:solidFill>
+              </a:rPr>
+              <a:t>Unit</a:t>
+            </a:r>
+            <a:endParaRPr lang="en-SG" sz="1050" dirty="0">
+              <a:solidFill>
+                <a:srgbClr val="7030A0"/>
+              </a:solidFill>
+            </a:endParaRPr>
+          </a:p>
+        </p:txBody>
+      </p:sp>
+      <p:sp>
+        <p:nvSpPr>
+          <p:cNvPr id="116" name="Rectangle 8"/>
+          <p:cNvSpPr/>
+          <p:nvPr/>
+        </p:nvSpPr>
+        <p:spPr>
+          <a:xfrm>
+            <a:off x="7086600" y="4724400"/>
+            <a:ext cx="533400" cy="304800"/>
+          </a:xfrm>
+          <a:prstGeom prst="rect">
+            <a:avLst/>
+          </a:prstGeom>
+          <a:ln w="19050">
+            <a:solidFill>
+              <a:srgbClr val="7030A0"/>
+            </a:solidFill>
+          </a:ln>
+          <a:effectLst/>
+        </p:spPr>
+        <p:style>
+          <a:lnRef idx="1">
+            <a:schemeClr val="accent4"/>
+          </a:lnRef>
+          <a:fillRef idx="2">
+            <a:schemeClr val="accent4"/>
+          </a:fillRef>
+          <a:effectRef idx="1">
+            <a:schemeClr val="accent4"/>
+          </a:effectRef>
+          <a:fontRef idx="minor">
+            <a:schemeClr val="dk1"/>
+          </a:fontRef>
+        </p:style>
+        <p:txBody>
+          <a:bodyPr rtlCol="0" anchor="ctr"/>
+          <a:lstStyle/>
+          <a:p>
+            <a:pPr algn="ctr"/>
+            <a:r>
+              <a:rPr lang="en-US" sz="1050" dirty="0" smtClean="0">
+                <a:solidFill>
+                  <a:srgbClr val="7030A0"/>
+                </a:solidFill>
+              </a:rPr>
+              <a:t>Street</a:t>
+            </a:r>
+            <a:endParaRPr lang="en-SG" sz="1050" dirty="0">
+              <a:solidFill>
+                <a:srgbClr val="7030A0"/>
+              </a:solidFill>
+            </a:endParaRPr>
+          </a:p>
+        </p:txBody>
+      </p:sp>
+      <p:sp>
+        <p:nvSpPr>
+          <p:cNvPr id="117" name="Rectangle 8"/>
+          <p:cNvSpPr/>
+          <p:nvPr/>
+        </p:nvSpPr>
+        <p:spPr>
+          <a:xfrm>
+            <a:off x="8153400" y="4724400"/>
+            <a:ext cx="838200" cy="304800"/>
+          </a:xfrm>
+          <a:prstGeom prst="rect">
+            <a:avLst/>
+          </a:prstGeom>
+          <a:ln w="19050">
+            <a:solidFill>
+              <a:srgbClr val="7030A0"/>
+            </a:solidFill>
+          </a:ln>
+          <a:effectLst/>
+        </p:spPr>
+        <p:style>
+          <a:lnRef idx="1">
+            <a:schemeClr val="accent4"/>
+          </a:lnRef>
+          <a:fillRef idx="2">
+            <a:schemeClr val="accent4"/>
+          </a:fillRef>
+          <a:effectRef idx="1">
+            <a:schemeClr val="accent4"/>
+          </a:effectRef>
+          <a:fontRef idx="minor">
+            <a:schemeClr val="dk1"/>
+          </a:fontRef>
+        </p:style>
+        <p:txBody>
+          <a:bodyPr rtlCol="0" anchor="ctr"/>
+          <a:lstStyle/>
+          <a:p>
+            <a:pPr algn="ctr"/>
+            <a:r>
+              <a:rPr lang="en-US" sz="1050" dirty="0" err="1" smtClean="0">
+                <a:solidFill>
+                  <a:srgbClr val="7030A0"/>
+                </a:solidFill>
+              </a:rPr>
+              <a:t>PostalCode</a:t>
+            </a:r>
+            <a:endParaRPr lang="en-SG" sz="1050" dirty="0">
+              <a:solidFill>
+                <a:srgbClr val="7030A0"/>
+              </a:solidFill>
+            </a:endParaRPr>
+          </a:p>
+        </p:txBody>
+      </p:sp>
+      <p:sp>
+        <p:nvSpPr>
+          <p:cNvPr id="125" name="TextBox 124"/>
+          <p:cNvSpPr txBox="1"/>
+          <p:nvPr/>
+        </p:nvSpPr>
+        <p:spPr>
+          <a:xfrm>
+            <a:off x="6477000" y="4495800"/>
+            <a:ext cx="189257" cy="178683"/>
+          </a:xfrm>
+          <a:prstGeom prst="rect">
+            <a:avLst/>
+          </a:prstGeom>
+          <a:noFill/>
+        </p:spPr>
+        <p:txBody>
+          <a:bodyPr wrap="square" lIns="0" tIns="0" rIns="0" bIns="0" rtlCol="0">
+            <a:noAutofit/>
+          </a:bodyPr>
+          <a:lstStyle/>
+          <a:p>
+            <a:pPr algn="ctr"/>
+            <a:r>
+              <a:rPr lang="en-US" sz="1100" dirty="0" smtClean="0">
+                <a:solidFill>
+                  <a:srgbClr val="7030A0"/>
+                </a:solidFill>
+              </a:rPr>
+              <a:t>1</a:t>
+            </a:r>
+            <a:endParaRPr lang="en-SG" sz="1100" dirty="0">
+              <a:solidFill>
+                <a:srgbClr val="7030A0"/>
+              </a:solidFill>
+            </a:endParaRPr>
+          </a:p>
+        </p:txBody>
+      </p:sp>
+      <p:sp>
+        <p:nvSpPr>
+          <p:cNvPr id="126" name="TextBox 125"/>
+          <p:cNvSpPr txBox="1"/>
+          <p:nvPr/>
+        </p:nvSpPr>
+        <p:spPr>
+          <a:xfrm>
+            <a:off x="7086600" y="4495800"/>
+            <a:ext cx="189257" cy="178683"/>
+          </a:xfrm>
+          <a:prstGeom prst="rect">
+            <a:avLst/>
+          </a:prstGeom>
+          <a:noFill/>
+        </p:spPr>
+        <p:txBody>
+          <a:bodyPr wrap="square" lIns="0" tIns="0" rIns="0" bIns="0" rtlCol="0">
+            <a:noAutofit/>
+          </a:bodyPr>
+          <a:lstStyle/>
+          <a:p>
+            <a:pPr algn="ctr"/>
+            <a:r>
+              <a:rPr lang="en-US" sz="1100" dirty="0" smtClean="0">
+                <a:solidFill>
+                  <a:srgbClr val="7030A0"/>
+                </a:solidFill>
+              </a:rPr>
+              <a:t>1</a:t>
+            </a:r>
+            <a:endParaRPr lang="en-SG" sz="1100" dirty="0">
+              <a:solidFill>
+                <a:srgbClr val="7030A0"/>
+              </a:solidFill>
+            </a:endParaRPr>
+          </a:p>
+        </p:txBody>
+      </p:sp>
+      <p:sp>
+        <p:nvSpPr>
+          <p:cNvPr id="127" name="TextBox 126"/>
+          <p:cNvSpPr txBox="1"/>
+          <p:nvPr/>
+        </p:nvSpPr>
+        <p:spPr>
+          <a:xfrm>
+            <a:off x="7543800" y="4495800"/>
+            <a:ext cx="304800" cy="228600"/>
+          </a:xfrm>
+          <a:prstGeom prst="rect">
+            <a:avLst/>
+          </a:prstGeom>
+          <a:noFill/>
+        </p:spPr>
+        <p:txBody>
+          <a:bodyPr wrap="square" lIns="0" tIns="0" rIns="0" bIns="0" rtlCol="0">
+            <a:noAutofit/>
+          </a:bodyPr>
+          <a:lstStyle/>
+          <a:p>
+            <a:pPr algn="ctr"/>
+            <a:r>
+              <a:rPr lang="en-US" sz="1100" dirty="0" smtClean="0">
+                <a:solidFill>
+                  <a:srgbClr val="7030A0"/>
+                </a:solidFill>
+              </a:rPr>
+              <a:t>0..1</a:t>
+            </a:r>
+            <a:endParaRPr lang="en-SG" sz="1100" dirty="0">
+              <a:solidFill>
+                <a:srgbClr val="7030A0"/>
+              </a:solidFill>
+            </a:endParaRPr>
+          </a:p>
+        </p:txBody>
+      </p:sp>
+      <p:sp>
+        <p:nvSpPr>
+          <p:cNvPr id="128" name="TextBox 127"/>
+          <p:cNvSpPr txBox="1"/>
+          <p:nvPr/>
+        </p:nvSpPr>
+        <p:spPr>
+          <a:xfrm>
+            <a:off x="8610600" y="4495800"/>
+            <a:ext cx="189257" cy="178683"/>
+          </a:xfrm>
+          <a:prstGeom prst="rect">
+            <a:avLst/>
+          </a:prstGeom>
+          <a:noFill/>
+        </p:spPr>
+        <p:txBody>
+          <a:bodyPr wrap="square" lIns="0" tIns="0" rIns="0" bIns="0" rtlCol="0">
+            <a:noAutofit/>
+          </a:bodyPr>
+          <a:lstStyle/>
+          <a:p>
+            <a:pPr algn="ctr"/>
+            <a:r>
+              <a:rPr lang="en-US" sz="1100" dirty="0" smtClean="0">
+                <a:solidFill>
+                  <a:srgbClr val="7030A0"/>
+                </a:solidFill>
+              </a:rPr>
+              <a:t>1</a:t>
+            </a:r>
+            <a:endParaRPr lang="en-SG" sz="1100" dirty="0">
+              <a:solidFill>
+                <a:srgbClr val="7030A0"/>
+              </a:solidFill>
+            </a:endParaRPr>
+          </a:p>
+        </p:txBody>
+      </p:sp>
+      <p:sp>
+        <p:nvSpPr>
+          <p:cNvPr id="129" name="Flowchart: Decision 96"/>
+          <p:cNvSpPr/>
+          <p:nvPr/>
+        </p:nvSpPr>
+        <p:spPr>
+          <a:xfrm>
+            <a:off x="7848600" y="457200"/>
+            <a:ext cx="228600" cy="249580"/>
+          </a:xfrm>
+          <a:prstGeom prst="flowChartDecision">
+            <a:avLst/>
+          </a:prstGeom>
+          <a:noFill/>
+          <a:ln w="19050">
+            <a:solidFill>
+              <a:srgbClr val="7030A0"/>
+            </a:solidFill>
+          </a:ln>
+          <a:effectLst/>
+        </p:spPr>
+        <p:style>
+          <a:lnRef idx="1">
+            <a:schemeClr val="accent6"/>
+          </a:lnRef>
+          <a:fillRef idx="2">
+            <a:schemeClr val="accent6"/>
+          </a:fillRef>
+          <a:effectRef idx="1">
+            <a:schemeClr val="accent6"/>
+          </a:effectRef>
+          <a:fontRef idx="minor">
+            <a:schemeClr val="dk1"/>
+          </a:fontRef>
+        </p:style>
+        <p:txBody>
+          <a:bodyPr rtlCol="0" anchor="ctr"/>
+          <a:lstStyle/>
+          <a:p>
+            <a:pPr algn="ctr"/>
+            <a:endParaRPr lang="en-US" sz="1050"/>
+          </a:p>
+        </p:txBody>
+      </p:sp>
+      <p:cxnSp>
+        <p:nvCxnSpPr>
+          <p:cNvPr id="130" name="Elbow Connector 129"/>
+          <p:cNvCxnSpPr>
+            <a:stCxn id="129" idx="0"/>
+            <a:endCxn id="132" idx="0"/>
+          </p:cNvCxnSpPr>
+          <p:nvPr/>
+        </p:nvCxnSpPr>
+        <p:spPr>
+          <a:xfrm rot="16200000" flipH="1" flipV="1">
+            <a:off x="7086600" y="-114300"/>
+            <a:ext cx="304800" cy="1447800"/>
+          </a:xfrm>
+          <a:prstGeom prst="bentConnector3">
+            <a:avLst>
+              <a:gd name="adj1" fmla="val -47222"/>
+            </a:avLst>
+          </a:prstGeom>
+          <a:ln w="19050">
+            <a:solidFill>
+              <a:srgbClr val="7030A0"/>
+            </a:solidFill>
+            <a:headEnd type="none" w="med" len="med"/>
+            <a:tailEnd type="arrow" w="med" len="med"/>
+          </a:ln>
+          <a:effectLst/>
+        </p:spPr>
+        <p:style>
+          <a:lnRef idx="1">
+            <a:schemeClr val="accent2"/>
+          </a:lnRef>
+          <a:fillRef idx="2">
+            <a:schemeClr val="accent2"/>
+          </a:fillRef>
+          <a:effectRef idx="1">
+            <a:schemeClr val="accent2"/>
+          </a:effectRef>
+          <a:fontRef idx="minor">
+            <a:schemeClr val="dk1"/>
+          </a:fontRef>
+        </p:style>
+      </p:cxnSp>
+      <p:sp>
+        <p:nvSpPr>
+          <p:cNvPr id="132" name="Rectangle 8"/>
+          <p:cNvSpPr/>
+          <p:nvPr/>
+        </p:nvSpPr>
+        <p:spPr>
+          <a:xfrm>
+            <a:off x="6248400" y="762000"/>
+            <a:ext cx="533400" cy="346760"/>
+          </a:xfrm>
+          <a:prstGeom prst="rect">
+            <a:avLst/>
+          </a:prstGeom>
+          <a:ln w="19050">
+            <a:solidFill>
+              <a:srgbClr val="7030A0"/>
+            </a:solidFill>
+          </a:ln>
+          <a:effectLst/>
+        </p:spPr>
+        <p:style>
+          <a:lnRef idx="1">
+            <a:schemeClr val="accent4"/>
+          </a:lnRef>
+          <a:fillRef idx="2">
+            <a:schemeClr val="accent4"/>
+          </a:fillRef>
+          <a:effectRef idx="1">
+            <a:schemeClr val="accent4"/>
+          </a:effectRef>
+          <a:fontRef idx="minor">
+            <a:schemeClr val="dk1"/>
+          </a:fontRef>
+        </p:style>
+        <p:txBody>
+          <a:bodyPr rtlCol="0" anchor="ctr"/>
+          <a:lstStyle/>
+          <a:p>
+            <a:pPr algn="ctr"/>
+            <a:r>
+              <a:rPr lang="en-US" sz="1050" dirty="0" smtClean="0">
+                <a:solidFill>
+                  <a:srgbClr val="7030A0"/>
+                </a:solidFill>
+              </a:rPr>
+              <a:t>Name</a:t>
+            </a:r>
+            <a:endParaRPr lang="en-SG" sz="1050" dirty="0">
+              <a:solidFill>
+                <a:srgbClr val="7030A0"/>
+              </a:solidFill>
+            </a:endParaRPr>
+          </a:p>
+        </p:txBody>
+      </p:sp>
+      <p:sp>
+        <p:nvSpPr>
+          <p:cNvPr id="135" name="TextBox 134"/>
+          <p:cNvSpPr txBox="1"/>
+          <p:nvPr/>
+        </p:nvSpPr>
+        <p:spPr>
+          <a:xfrm>
+            <a:off x="6629400" y="533400"/>
+            <a:ext cx="304800" cy="178683"/>
+          </a:xfrm>
+          <a:prstGeom prst="rect">
+            <a:avLst/>
+          </a:prstGeom>
+          <a:noFill/>
+        </p:spPr>
+        <p:txBody>
+          <a:bodyPr wrap="square" lIns="0" tIns="0" rIns="0" bIns="0" rtlCol="0">
+            <a:noAutofit/>
+          </a:bodyPr>
+          <a:lstStyle/>
+          <a:p>
+            <a:pPr algn="ctr"/>
+            <a:r>
+              <a:rPr lang="en-US" sz="1100" dirty="0" smtClean="0">
+                <a:solidFill>
+                  <a:srgbClr val="7030A0"/>
+                </a:solidFill>
+              </a:rPr>
+              <a:t>1*</a:t>
+            </a:r>
+            <a:endParaRPr lang="en-SG" sz="1100" dirty="0">
+              <a:solidFill>
+                <a:srgbClr val="7030A0"/>
+              </a:solidFill>
+            </a:endParaRPr>
+          </a:p>
+        </p:txBody>
+      </p:sp>
     </p:spTree>
     <p:extLst>
       <p:ext uri="{BB962C8B-B14F-4D97-AF65-F5344CB8AC3E}">
@@ -6540,7 +7598,7 @@
   <p:timing>
     <p:tnLst>
       <p:par>
-        <p:cTn id="1" dur="indefinite" restart="never" nodeType="tmRoot"/>
+        <p:cTn xmlns:p14="http://schemas.microsoft.com/office/powerpoint/2010/main" id="1" dur="indefinite" restart="never" nodeType="tmRoot"/>
       </p:par>
     </p:tnLst>
   </p:timing>

</xml_diff>